<commit_message>
upload chap 3 & 4
</commit_message>
<xml_diff>
--- a/docs/chap3_slide.pptx
+++ b/docs/chap3_slide.pptx
@@ -16,6 +16,12 @@
     <p:sldId id="264" r:id="rId10"/>
     <p:sldId id="265" r:id="rId11"/>
     <p:sldId id="266" r:id="rId12"/>
+    <p:sldId id="267" r:id="rId13"/>
+    <p:sldId id="268" r:id="rId14"/>
+    <p:sldId id="269" r:id="rId15"/>
+    <p:sldId id="270" r:id="rId16"/>
+    <p:sldId id="271" r:id="rId17"/>
+    <p:sldId id="272" r:id="rId18"/>
   </p:sldIdLst>
   <p:sldSz cx="9144000" cy="5143500" type="screen16x9"/>
   <p:notesSz cx="6858000" cy="9144000"/>
@@ -3125,7 +3131,7 @@
             </a:pPr>
             <a:r>
               <a:rPr/>
-              <a:t>第1章 统计分析与Excel概览</a:t>
+              <a:t>第3章 定量数据的图表展示</a:t>
             </a:r>
           </a:p>
         </p:txBody>
@@ -3155,6 +3161,10 @@
             </a:pPr>
             <a:br/>
             <a:br/>
+            <a:r>
+              <a:rPr/>
+              <a:t>《精通Excel数据统计与分析》</a:t>
+            </a:r>
           </a:p>
         </p:txBody>
       </p:sp>
@@ -3200,37 +3210,67 @@
             </a:pPr>
             <a:r>
               <a:rPr/>
-              <a:t>1.3 Excel常用技巧</a:t>
-            </a:r>
-          </a:p>
-        </p:txBody>
-      </p:sp>
-      <p:sp>
-        <p:nvSpPr>
-          <p:cNvPr id="3" name="Content Placeholder 2"/>
-          <p:cNvSpPr>
-            <a:spLocks noGrp="1"/>
-          </p:cNvSpPr>
-          <p:nvPr>
-            <p:ph idx="1"/>
-          </p:nvPr>
-        </p:nvSpPr>
-        <p:spPr/>
-        <p:txBody>
-          <a:bodyPr/>
-          <a:lstStyle/>
-          <a:p>
-            <a:pPr lvl="0"/>
+              <a:t>3.2.2 累积频数折线图</a:t>
+            </a:r>
+          </a:p>
+        </p:txBody>
+      </p:sp>
+      <p:pic>
+        <p:nvPicPr>
+          <p:cNvPr descr="img/pic3.9.png" id="0" name="Picture 1"/>
+          <p:cNvPicPr>
+            <a:picLocks noGrp="1" noChangeAspect="1"/>
+          </p:cNvPicPr>
+          <p:nvPr/>
+        </p:nvPicPr>
+        <p:blipFill>
+          <a:blip r:embed="rId2"/>
+          <a:stretch>
+            <a:fillRect/>
+          </a:stretch>
+        </p:blipFill>
+        <p:spPr bwMode="auto">
+          <a:xfrm>
+            <a:off x="1562100" y="1193800"/>
+            <a:ext cx="6032500" cy="2882900"/>
+          </a:xfrm>
+          <a:prstGeom prst="rect">
+            <a:avLst/>
+          </a:prstGeom>
+          <a:noFill/>
+          <a:ln w="9525">
+            <a:noFill/>
+            <a:headEnd/>
+            <a:tailEnd/>
+          </a:ln>
+        </p:spPr>
+      </p:pic>
+      <p:sp>
+        <p:nvSpPr>
+          <p:cNvPr id="1" name="TextBox 3"/>
+          <p:cNvSpPr txBox="1"/>
+          <p:nvPr/>
+        </p:nvSpPr>
+        <p:spPr>
+          <a:xfrm>
+            <a:off x="457200" y="4076700"/>
+            <a:ext cx="8229600" cy="508000"/>
+          </a:xfrm>
+          <a:prstGeom prst="rect">
+            <a:avLst/>
+          </a:prstGeom>
+          <a:noFill/>
+        </p:spPr>
+        <p:txBody>
+          <a:bodyPr/>
+          <a:lstStyle/>
+          <a:p>
+            <a:pPr lvl="0" indent="0" marL="0" algn="ctr">
+              <a:buNone/>
+            </a:pPr>
             <a:r>
               <a:rPr/>
-              <a:t>1.3.1 Excel的快捷键</a:t>
-            </a:r>
-          </a:p>
-          <a:p>
-            <a:pPr lvl="0"/>
-            <a:r>
-              <a:rPr/>
-              <a:t>1.3.2 单元格填充柄</a:t>
+              <a:t>图3.9 年龄的累积频数折线图</a:t>
             </a:r>
           </a:p>
         </p:txBody>
@@ -3277,7 +3317,7 @@
             </a:pPr>
             <a:r>
               <a:rPr/>
-              <a:t>1.4 Excel的数据清洗工具</a:t>
+              <a:t>3.2.3 累积百分比折线图</a:t>
             </a:r>
           </a:p>
         </p:txBody>
@@ -3300,74 +3340,577 @@
             <a:pPr lvl="0"/>
             <a:r>
               <a:rPr/>
-              <a:t>1.4.1 剔除重复个案</a:t>
+              <a:t>利用原始数据绘制累积百分比折线图</a:t>
             </a:r>
           </a:p>
           <a:p>
             <a:pPr lvl="0"/>
             <a:r>
               <a:rPr/>
-              <a:t>1.4.2 剔除有缺失值的个案</a:t>
-            </a:r>
-          </a:p>
+              <a:t>利用分组数据绘制累积百分比折线图</a:t>
+            </a:r>
+          </a:p>
+        </p:txBody>
+      </p:sp>
+    </p:spTree>
+  </p:cSld>
+</p:sld>
+</file>
+
+<file path=ppt/slides/slide12.xml><?xml version="1.0" encoding="utf-8"?>
+<p:sld xmlns:a="http://schemas.openxmlformats.org/drawingml/2006/main" xmlns:r="http://schemas.openxmlformats.org/officeDocument/2006/relationships" xmlns:p="http://schemas.openxmlformats.org/presentationml/2006/main">
+  <p:cSld>
+    <p:spTree>
+      <p:nvGrpSpPr>
+        <p:cNvPr id="1" name=""/>
+        <p:cNvGrpSpPr/>
+        <p:nvPr/>
+      </p:nvGrpSpPr>
+      <p:grpSpPr>
+        <a:xfrm>
+          <a:off x="0" y="0"/>
+          <a:ext cx="0" cy="0"/>
+          <a:chOff x="0" y="0"/>
+          <a:chExt cx="0" cy="0"/>
+        </a:xfrm>
+      </p:grpSpPr>
+      <p:sp>
+        <p:nvSpPr>
+          <p:cNvPr id="2" name="Title 1"/>
+          <p:cNvSpPr>
+            <a:spLocks noGrp="1"/>
+          </p:cNvSpPr>
+          <p:nvPr>
+            <p:ph type="title"/>
+          </p:nvPr>
+        </p:nvSpPr>
+        <p:spPr/>
+        <p:txBody>
+          <a:bodyPr/>
+          <a:lstStyle/>
+          <a:p>
+            <a:pPr lvl="0" indent="0" marL="0">
+              <a:buNone/>
+            </a:pPr>
+            <a:r>
+              <a:rPr/>
+              <a:t>3.2.3 累积百分比折线图实操技巧</a:t>
+            </a:r>
+          </a:p>
+        </p:txBody>
+      </p:sp>
+      <p:sp>
+        <p:nvSpPr>
+          <p:cNvPr id="3" name="Content Placeholder 2"/>
+          <p:cNvSpPr>
+            <a:spLocks noGrp="1"/>
+          </p:cNvSpPr>
+          <p:nvPr>
+            <p:ph idx="1"/>
+          </p:nvPr>
+        </p:nvSpPr>
+        <p:spPr/>
+        <p:txBody>
+          <a:bodyPr/>
+          <a:lstStyle/>
           <a:p>
             <a:pPr lvl="0"/>
             <a:r>
               <a:rPr/>
-              <a:t>1.4.3 英文字母的大小写转换</a:t>
+              <a:t>利用数据透视表创建定量变量的频数分布，单击“插入”→“折线图”，创建频数折线图。</a:t>
             </a:r>
           </a:p>
           <a:p>
             <a:pPr lvl="0"/>
             <a:r>
               <a:rPr/>
-              <a:t>1.4.4 删除多余的空格</a:t>
+              <a:t>在数据透视表中，对汇总字段进行字段设置，在“数据显示方式”下拉框中选择“按某一字段汇总”，或者“按某一字段汇总的百分比”，即可报告累积频数或者累积百分比。</a:t>
             </a:r>
           </a:p>
           <a:p>
             <a:pPr lvl="0"/>
             <a:r>
               <a:rPr/>
-              <a:t>1.4.5 观测值的批量替换</a:t>
-            </a:r>
-          </a:p>
+              <a:t>累积频数折线图、累积百分比折线图可以展示定量变量小于等于某个值的个案数或者占比。</a:t>
+            </a:r>
+          </a:p>
+        </p:txBody>
+      </p:sp>
+    </p:spTree>
+  </p:cSld>
+</p:sld>
+</file>
+
+<file path=ppt/slides/slide13.xml><?xml version="1.0" encoding="utf-8"?>
+<p:sld xmlns:a="http://schemas.openxmlformats.org/drawingml/2006/main" xmlns:r="http://schemas.openxmlformats.org/officeDocument/2006/relationships" xmlns:p="http://schemas.openxmlformats.org/presentationml/2006/main">
+  <p:cSld>
+    <p:spTree>
+      <p:nvGrpSpPr>
+        <p:cNvPr id="1" name=""/>
+        <p:cNvGrpSpPr/>
+        <p:nvPr/>
+      </p:nvGrpSpPr>
+      <p:grpSpPr>
+        <a:xfrm>
+          <a:off x="0" y="0"/>
+          <a:ext cx="0" cy="0"/>
+          <a:chOff x="0" y="0"/>
+          <a:chExt cx="0" cy="0"/>
+        </a:xfrm>
+      </p:grpSpPr>
+      <p:sp>
+        <p:nvSpPr>
+          <p:cNvPr id="2" name="Title 1"/>
+          <p:cNvSpPr>
+            <a:spLocks noGrp="1"/>
+          </p:cNvSpPr>
+          <p:nvPr>
+            <p:ph type="title"/>
+          </p:nvPr>
+        </p:nvSpPr>
+        <p:spPr/>
+        <p:txBody>
+          <a:bodyPr/>
+          <a:lstStyle/>
+          <a:p>
+            <a:pPr lvl="0" indent="0" marL="0">
+              <a:buNone/>
+            </a:pPr>
+            <a:r>
+              <a:rPr/>
+              <a:t>3.3 箱线图</a:t>
+            </a:r>
+          </a:p>
+        </p:txBody>
+      </p:sp>
+      <p:sp>
+        <p:nvSpPr>
+          <p:cNvPr id="3" name="Content Placeholder 2"/>
+          <p:cNvSpPr>
+            <a:spLocks noGrp="1"/>
+          </p:cNvSpPr>
+          <p:nvPr>
+            <p:ph idx="1"/>
+          </p:nvPr>
+        </p:nvSpPr>
+        <p:spPr/>
+        <p:txBody>
+          <a:bodyPr/>
+          <a:lstStyle/>
           <a:p>
             <a:pPr lvl="0"/>
             <a:r>
               <a:rPr/>
-              <a:t>1.4.6 文本分列</a:t>
+              <a:t>3.3.1 箱线图的形式</a:t>
             </a:r>
           </a:p>
           <a:p>
             <a:pPr lvl="0"/>
             <a:r>
               <a:rPr/>
-              <a:t>1.4.7 以文本形式存储的数字的转化</a:t>
-            </a:r>
-          </a:p>
-          <a:p>
-            <a:pPr lvl="0"/>
+              <a:t>3.3.2 绘制箱线图</a:t>
+            </a:r>
+          </a:p>
+        </p:txBody>
+      </p:sp>
+    </p:spTree>
+  </p:cSld>
+</p:sld>
+</file>
+
+<file path=ppt/slides/slide14.xml><?xml version="1.0" encoding="utf-8"?>
+<p:sld xmlns:a="http://schemas.openxmlformats.org/drawingml/2006/main" xmlns:r="http://schemas.openxmlformats.org/officeDocument/2006/relationships" xmlns:p="http://schemas.openxmlformats.org/presentationml/2006/main">
+  <p:cSld>
+    <p:spTree>
+      <p:nvGrpSpPr>
+        <p:cNvPr id="1" name=""/>
+        <p:cNvGrpSpPr/>
+        <p:nvPr/>
+      </p:nvGrpSpPr>
+      <p:grpSpPr>
+        <a:xfrm>
+          <a:off x="0" y="0"/>
+          <a:ext cx="0" cy="0"/>
+          <a:chOff x="0" y="0"/>
+          <a:chExt cx="0" cy="0"/>
+        </a:xfrm>
+      </p:grpSpPr>
+      <p:sp>
+        <p:nvSpPr>
+          <p:cNvPr id="2" name="Title 1"/>
+          <p:cNvSpPr>
+            <a:spLocks noGrp="1"/>
+          </p:cNvSpPr>
+          <p:nvPr>
+            <p:ph type="title"/>
+          </p:nvPr>
+        </p:nvSpPr>
+        <p:spPr/>
+        <p:txBody>
+          <a:bodyPr/>
+          <a:lstStyle/>
+          <a:p>
+            <a:pPr lvl="0" indent="0" marL="0">
+              <a:buNone/>
+            </a:pPr>
             <a:r>
               <a:rPr/>
-              <a:t>1.4.8 快速填充</a:t>
-            </a:r>
-          </a:p>
-          <a:p>
-            <a:pPr lvl="0"/>
+              <a:t>3.3.1 箱线图的形式</a:t>
+            </a:r>
+          </a:p>
+        </p:txBody>
+      </p:sp>
+      <p:pic>
+        <p:nvPicPr>
+          <p:cNvPr descr="img/pic3.13.png" id="0" name="Picture 1"/>
+          <p:cNvPicPr>
+            <a:picLocks noGrp="1" noChangeAspect="1"/>
+          </p:cNvPicPr>
+          <p:nvPr/>
+        </p:nvPicPr>
+        <p:blipFill>
+          <a:blip r:embed="rId2"/>
+          <a:stretch>
+            <a:fillRect/>
+          </a:stretch>
+        </p:blipFill>
+        <p:spPr bwMode="auto">
+          <a:xfrm>
+            <a:off x="457200" y="1485900"/>
+            <a:ext cx="8229600" cy="2311400"/>
+          </a:xfrm>
+          <a:prstGeom prst="rect">
+            <a:avLst/>
+          </a:prstGeom>
+          <a:noFill/>
+          <a:ln w="9525">
+            <a:noFill/>
+            <a:headEnd/>
+            <a:tailEnd/>
+          </a:ln>
+        </p:spPr>
+      </p:pic>
+      <p:sp>
+        <p:nvSpPr>
+          <p:cNvPr id="1" name="TextBox 3"/>
+          <p:cNvSpPr txBox="1"/>
+          <p:nvPr/>
+        </p:nvSpPr>
+        <p:spPr>
+          <a:xfrm>
+            <a:off x="457200" y="4076700"/>
+            <a:ext cx="8229600" cy="508000"/>
+          </a:xfrm>
+          <a:prstGeom prst="rect">
+            <a:avLst/>
+          </a:prstGeom>
+          <a:noFill/>
+        </p:spPr>
+        <p:txBody>
+          <a:bodyPr/>
+          <a:lstStyle/>
+          <a:p>
+            <a:pPr lvl="0" indent="0" marL="0" algn="ctr">
+              <a:buNone/>
+            </a:pPr>
             <a:r>
               <a:rPr/>
-              <a:t>1.4.9 异常值和缺失值的识别</a:t>
-            </a:r>
-          </a:p>
-          <a:p>
-            <a:pPr lvl="0"/>
+              <a:t>图3.13标注异常值的箱线图</a:t>
+            </a:r>
+          </a:p>
+        </p:txBody>
+      </p:sp>
+    </p:spTree>
+  </p:cSld>
+</p:sld>
+</file>
+
+<file path=ppt/slides/slide15.xml><?xml version="1.0" encoding="utf-8"?>
+<p:sld xmlns:a="http://schemas.openxmlformats.org/drawingml/2006/main" xmlns:r="http://schemas.openxmlformats.org/officeDocument/2006/relationships" xmlns:p="http://schemas.openxmlformats.org/presentationml/2006/main">
+  <p:cSld>
+    <p:spTree>
+      <p:nvGrpSpPr>
+        <p:cNvPr id="1" name=""/>
+        <p:cNvGrpSpPr/>
+        <p:nvPr/>
+      </p:nvGrpSpPr>
+      <p:grpSpPr>
+        <a:xfrm>
+          <a:off x="0" y="0"/>
+          <a:ext cx="0" cy="0"/>
+          <a:chOff x="0" y="0"/>
+          <a:chExt cx="0" cy="0"/>
+        </a:xfrm>
+      </p:grpSpPr>
+      <p:sp>
+        <p:nvSpPr>
+          <p:cNvPr id="2" name="Title 1"/>
+          <p:cNvSpPr>
+            <a:spLocks noGrp="1"/>
+          </p:cNvSpPr>
+          <p:nvPr>
+            <p:ph type="title"/>
+          </p:nvPr>
+        </p:nvSpPr>
+        <p:spPr/>
+        <p:txBody>
+          <a:bodyPr/>
+          <a:lstStyle/>
+          <a:p>
+            <a:pPr lvl="0" indent="0" marL="0">
+              <a:buNone/>
+            </a:pPr>
             <a:r>
               <a:rPr/>
-              <a:t>1.4.10 数值代码转换为文本</a:t>
-            </a:r>
-          </a:p>
-        </p:txBody>
-      </p:sp>
+              <a:t>3.3.2 绘制箱线图</a:t>
+            </a:r>
+          </a:p>
+        </p:txBody>
+      </p:sp>
+      <p:pic>
+        <p:nvPicPr>
+          <p:cNvPr descr="img/pic3.16.png" id="0" name="Picture 1"/>
+          <p:cNvPicPr>
+            <a:picLocks noGrp="1" noChangeAspect="1"/>
+          </p:cNvPicPr>
+          <p:nvPr/>
+        </p:nvPicPr>
+        <p:blipFill>
+          <a:blip r:embed="rId2"/>
+          <a:stretch>
+            <a:fillRect/>
+          </a:stretch>
+        </p:blipFill>
+        <p:spPr bwMode="auto">
+          <a:xfrm>
+            <a:off x="2159000" y="1193800"/>
+            <a:ext cx="4813300" cy="2882900"/>
+          </a:xfrm>
+          <a:prstGeom prst="rect">
+            <a:avLst/>
+          </a:prstGeom>
+          <a:noFill/>
+          <a:ln w="9525">
+            <a:noFill/>
+            <a:headEnd/>
+            <a:tailEnd/>
+          </a:ln>
+        </p:spPr>
+      </p:pic>
+      <p:sp>
+        <p:nvSpPr>
+          <p:cNvPr id="1" name="TextBox 3"/>
+          <p:cNvSpPr txBox="1"/>
+          <p:nvPr/>
+        </p:nvSpPr>
+        <p:spPr>
+          <a:xfrm>
+            <a:off x="457200" y="4076700"/>
+            <a:ext cx="8229600" cy="508000"/>
+          </a:xfrm>
+          <a:prstGeom prst="rect">
+            <a:avLst/>
+          </a:prstGeom>
+          <a:noFill/>
+        </p:spPr>
+        <p:txBody>
+          <a:bodyPr/>
+          <a:lstStyle/>
+          <a:p>
+            <a:pPr lvl="0" indent="0" marL="0" algn="ctr">
+              <a:buNone/>
+            </a:pPr>
+            <a:r>
+              <a:rPr/>
+              <a:t>图3.16 箱线图的设置</a:t>
+            </a:r>
+          </a:p>
+        </p:txBody>
+      </p:sp>
+    </p:spTree>
+  </p:cSld>
+</p:sld>
+</file>
+
+<file path=ppt/slides/slide16.xml><?xml version="1.0" encoding="utf-8"?>
+<p:sld xmlns:a="http://schemas.openxmlformats.org/drawingml/2006/main" xmlns:r="http://schemas.openxmlformats.org/officeDocument/2006/relationships" xmlns:p="http://schemas.openxmlformats.org/presentationml/2006/main">
+  <p:cSld>
+    <p:spTree>
+      <p:nvGrpSpPr>
+        <p:cNvPr id="1" name=""/>
+        <p:cNvGrpSpPr/>
+        <p:nvPr/>
+      </p:nvGrpSpPr>
+      <p:grpSpPr>
+        <a:xfrm>
+          <a:off x="0" y="0"/>
+          <a:ext cx="0" cy="0"/>
+          <a:chOff x="0" y="0"/>
+          <a:chExt cx="0" cy="0"/>
+        </a:xfrm>
+      </p:grpSpPr>
+      <p:sp>
+        <p:nvSpPr>
+          <p:cNvPr id="2" name="Title 1"/>
+          <p:cNvSpPr>
+            <a:spLocks noGrp="1"/>
+          </p:cNvSpPr>
+          <p:nvPr>
+            <p:ph type="title"/>
+          </p:nvPr>
+        </p:nvSpPr>
+        <p:spPr/>
+        <p:txBody>
+          <a:bodyPr/>
+          <a:lstStyle/>
+          <a:p>
+            <a:pPr lvl="0" indent="0" marL="0">
+              <a:buNone/>
+            </a:pPr>
+            <a:r>
+              <a:rPr/>
+              <a:t>3.4 茎叶图</a:t>
+            </a:r>
+          </a:p>
+        </p:txBody>
+      </p:sp>
+      <p:pic>
+        <p:nvPicPr>
+          <p:cNvPr descr="img/pic3.17.png" id="0" name="Picture 1"/>
+          <p:cNvPicPr>
+            <a:picLocks noGrp="1" noChangeAspect="1"/>
+          </p:cNvPicPr>
+          <p:nvPr/>
+        </p:nvPicPr>
+        <p:blipFill>
+          <a:blip r:embed="rId2"/>
+          <a:stretch>
+            <a:fillRect/>
+          </a:stretch>
+        </p:blipFill>
+        <p:spPr bwMode="auto">
+          <a:xfrm>
+            <a:off x="1714500" y="1193800"/>
+            <a:ext cx="5715000" cy="2882900"/>
+          </a:xfrm>
+          <a:prstGeom prst="rect">
+            <a:avLst/>
+          </a:prstGeom>
+          <a:noFill/>
+          <a:ln w="9525">
+            <a:noFill/>
+            <a:headEnd/>
+            <a:tailEnd/>
+          </a:ln>
+        </p:spPr>
+      </p:pic>
+      <p:sp>
+        <p:nvSpPr>
+          <p:cNvPr id="1" name="TextBox 3"/>
+          <p:cNvSpPr txBox="1"/>
+          <p:nvPr/>
+        </p:nvSpPr>
+        <p:spPr>
+          <a:xfrm>
+            <a:off x="457200" y="4076700"/>
+            <a:ext cx="8229600" cy="508000"/>
+          </a:xfrm>
+          <a:prstGeom prst="rect">
+            <a:avLst/>
+          </a:prstGeom>
+          <a:noFill/>
+        </p:spPr>
+        <p:txBody>
+          <a:bodyPr/>
+          <a:lstStyle/>
+          <a:p>
+            <a:pPr lvl="0" indent="0" marL="0" algn="ctr">
+              <a:buNone/>
+            </a:pPr>
+            <a:r>
+              <a:rPr/>
+              <a:t>图3.17 设置直方图的分组区间</a:t>
+            </a:r>
+          </a:p>
+        </p:txBody>
+      </p:sp>
+    </p:spTree>
+  </p:cSld>
+</p:sld>
+</file>
+
+<file path=ppt/slides/slide17.xml><?xml version="1.0" encoding="utf-8"?>
+<p:sld xmlns:a="http://schemas.openxmlformats.org/drawingml/2006/main" xmlns:r="http://schemas.openxmlformats.org/officeDocument/2006/relationships" xmlns:p="http://schemas.openxmlformats.org/presentationml/2006/main">
+  <p:cSld>
+    <p:spTree>
+      <p:nvGrpSpPr>
+        <p:cNvPr id="1" name=""/>
+        <p:cNvGrpSpPr/>
+        <p:nvPr/>
+      </p:nvGrpSpPr>
+      <p:grpSpPr>
+        <a:xfrm>
+          <a:off x="0" y="0"/>
+          <a:ext cx="0" cy="0"/>
+          <a:chOff x="0" y="0"/>
+          <a:chExt cx="0" cy="0"/>
+        </a:xfrm>
+      </p:grpSpPr>
+      <p:sp>
+        <p:nvSpPr>
+          <p:cNvPr id="2" name="Title 1"/>
+          <p:cNvSpPr>
+            <a:spLocks noGrp="1"/>
+          </p:cNvSpPr>
+          <p:nvPr>
+            <p:ph type="title"/>
+          </p:nvPr>
+        </p:nvSpPr>
+        <p:spPr/>
+        <p:txBody>
+          <a:bodyPr/>
+          <a:lstStyle/>
+          <a:p>
+            <a:pPr lvl="0" indent="0" marL="0">
+              <a:buNone/>
+            </a:pPr>
+            <a:r>
+              <a:rPr/>
+              <a:t>第3章总结</a:t>
+            </a:r>
+          </a:p>
+        </p:txBody>
+      </p:sp>
+      <p:pic>
+        <p:nvPicPr>
+          <p:cNvPr descr="img/pic3.19.png" id="0" name="Picture 1"/>
+          <p:cNvPicPr>
+            <a:picLocks noGrp="1" noChangeAspect="1"/>
+          </p:cNvPicPr>
+          <p:nvPr/>
+        </p:nvPicPr>
+        <p:blipFill>
+          <a:blip r:embed="rId2"/>
+          <a:stretch>
+            <a:fillRect/>
+          </a:stretch>
+        </p:blipFill>
+        <p:spPr bwMode="auto">
+          <a:xfrm>
+            <a:off x="2082800" y="1193800"/>
+            <a:ext cx="4965700" cy="3390900"/>
+          </a:xfrm>
+          <a:prstGeom prst="rect">
+            <a:avLst/>
+          </a:prstGeom>
+          <a:noFill/>
+          <a:ln w="9525">
+            <a:noFill/>
+            <a:headEnd/>
+            <a:tailEnd/>
+          </a:ln>
+        </p:spPr>
+      </p:pic>
     </p:spTree>
   </p:cSld>
 </p:sld>
@@ -3410,7 +3953,7 @@
             </a:pPr>
             <a:r>
               <a:rPr/>
-              <a:t>第1章 统计分析与Excel概览</a:t>
+              <a:t>第3章 定量数据的图表展示</a:t>
             </a:r>
           </a:p>
         </p:txBody>
@@ -3433,28 +3976,28 @@
             <a:pPr lvl="0"/>
             <a:r>
               <a:rPr/>
-              <a:t>1.1 统计分析的步骤</a:t>
+              <a:t>3.1 直方图</a:t>
             </a:r>
           </a:p>
           <a:p>
             <a:pPr lvl="0"/>
             <a:r>
               <a:rPr/>
-              <a:t>1.2 Excel的统计分析工具</a:t>
+              <a:t>3.2 分布折线图</a:t>
             </a:r>
           </a:p>
           <a:p>
             <a:pPr lvl="0"/>
             <a:r>
               <a:rPr/>
-              <a:t>1.3 Excel常用技巧</a:t>
+              <a:t>3.3 箱线图</a:t>
             </a:r>
           </a:p>
           <a:p>
             <a:pPr lvl="0"/>
             <a:r>
               <a:rPr/>
-              <a:t>1.4 Excel的数据清洗工具</a:t>
+              <a:t>3.4 茎叶图</a:t>
             </a:r>
           </a:p>
         </p:txBody>
@@ -3501,7 +4044,7 @@
             </a:pPr>
             <a:r>
               <a:rPr/>
-              <a:t>1.1 统计分析的步骤</a:t>
+              <a:t>3.1 直方图</a:t>
             </a:r>
           </a:p>
         </p:txBody>
@@ -3524,28 +4067,14 @@
             <a:pPr lvl="0"/>
             <a:r>
               <a:rPr/>
-              <a:t>1.1.1 收集数据</a:t>
+              <a:t>3.1.1 基于原始数据绘制直方图</a:t>
             </a:r>
           </a:p>
           <a:p>
             <a:pPr lvl="0"/>
             <a:r>
               <a:rPr/>
-              <a:t>1.1.2 整理数据</a:t>
-            </a:r>
-          </a:p>
-          <a:p>
-            <a:pPr lvl="0"/>
-            <a:r>
-              <a:rPr/>
-              <a:t>1.1.3 分析数据</a:t>
-            </a:r>
-          </a:p>
-          <a:p>
-            <a:pPr lvl="0"/>
-            <a:r>
-              <a:rPr/>
-              <a:t>1.1.4 提炼结论</a:t>
+              <a:t>3.1.2 基于频数分布表绘制直方图</a:t>
             </a:r>
           </a:p>
         </p:txBody>
@@ -3658,104 +4187,6 @@
                       </p:childTnLst>
                     </p:cTn>
                   </p:par>
-                  <p:par>
-                    <p:cTn id="11" fill="hold">
-                      <p:stCondLst>
-                        <p:cond delay="indefinite"/>
-                      </p:stCondLst>
-                      <p:childTnLst>
-                        <p:par>
-                          <p:cTn id="12" fill="hold">
-                            <p:stCondLst>
-                              <p:cond delay="0"/>
-                            </p:stCondLst>
-                            <p:childTnLst>
-                              <p:par>
-                                <p:cTn id="13" presetID="1" presetClass="entr" presetSubtype="0" fill="hold" grpId="0" nodeType="clickEffect">
-                                  <p:stCondLst>
-                                    <p:cond delay="0"/>
-                                  </p:stCondLst>
-                                  <p:childTnLst>
-                                    <p:set>
-                                      <p:cBhvr>
-                                        <p:cTn id="14" dur="1" fill="hold">
-                                          <p:stCondLst>
-                                            <p:cond delay="0"/>
-                                          </p:stCondLst>
-                                        </p:cTn>
-                                        <p:tgtEl>
-                                          <p:spTgt spid="3">
-                                            <p:txEl>
-                                              <p:pRg st="2" end="2"/>
-                                            </p:txEl>
-                                          </p:spTgt>
-                                        </p:tgtEl>
-                                        <p:attrNameLst>
-                                          <p:attrName>style.visibility</p:attrName>
-                                        </p:attrNameLst>
-                                      </p:cBhvr>
-                                      <p:to>
-                                        <p:strVal val="visible"/>
-                                      </p:to>
-                                    </p:set>
-                                  </p:childTnLst>
-                                </p:cTn>
-                              </p:par>
-                            </p:childTnLst>
-                          </p:cTn>
-                        </p:par>
-                      </p:childTnLst>
-                    </p:cTn>
-                  </p:par>
-                  <p:par>
-                    <p:cTn id="15" fill="hold">
-                      <p:stCondLst>
-                        <p:cond delay="indefinite"/>
-                      </p:stCondLst>
-                      <p:childTnLst>
-                        <p:par>
-                          <p:cTn id="16" fill="hold">
-                            <p:stCondLst>
-                              <p:cond delay="0"/>
-                            </p:stCondLst>
-                            <p:childTnLst>
-                              <p:par>
-                                <p:cTn id="17" presetID="1" presetClass="entr" presetSubtype="0" fill="hold" grpId="0" nodeType="clickEffect">
-                                  <p:stCondLst>
-                                    <p:cond delay="0"/>
-                                  </p:stCondLst>
-                                  <p:childTnLst>
-                                    <p:set>
-                                      <p:cBhvr>
-                                        <p:cTn id="18" dur="1" fill="hold">
-                                          <p:stCondLst>
-                                            <p:cond delay="0"/>
-                                          </p:stCondLst>
-                                        </p:cTn>
-                                        <p:tgtEl>
-                                          <p:spTgt spid="3">
-                                            <p:txEl>
-                                              <p:pRg st="3" end="3"/>
-                                            </p:txEl>
-                                          </p:spTgt>
-                                        </p:tgtEl>
-                                        <p:attrNameLst>
-                                          <p:attrName>style.visibility</p:attrName>
-                                        </p:attrNameLst>
-                                      </p:cBhvr>
-                                      <p:to>
-                                        <p:strVal val="visible"/>
-                                      </p:to>
-                                    </p:set>
-                                  </p:childTnLst>
-                                </p:cTn>
-                              </p:par>
-                            </p:childTnLst>
-                          </p:cTn>
-                        </p:par>
-                      </p:childTnLst>
-                    </p:cTn>
-                  </p:par>
                 </p:childTnLst>
               </p:cTn>
               <p:prevCondLst>
@@ -3821,65 +4252,67 @@
             </a:pPr>
             <a:r>
               <a:rPr/>
-              <a:t>1.1.1 收集数据</a:t>
-            </a:r>
-          </a:p>
-        </p:txBody>
-      </p:sp>
-      <p:sp>
-        <p:nvSpPr>
-          <p:cNvPr id="3" name="Content Placeholder 2"/>
-          <p:cNvSpPr>
-            <a:spLocks noGrp="1"/>
-          </p:cNvSpPr>
-          <p:nvPr>
-            <p:ph idx="1"/>
-          </p:nvPr>
-        </p:nvSpPr>
-        <p:spPr/>
-        <p:txBody>
-          <a:bodyPr/>
-          <a:lstStyle/>
-          <a:p>
-            <a:pPr lvl="0"/>
+              <a:t>3.1.1 基于原始数据绘制直方图</a:t>
+            </a:r>
+          </a:p>
+        </p:txBody>
+      </p:sp>
+      <p:pic>
+        <p:nvPicPr>
+          <p:cNvPr descr="img/pic3.2.png" id="0" name="Picture 1"/>
+          <p:cNvPicPr>
+            <a:picLocks noGrp="1" noChangeAspect="1"/>
+          </p:cNvPicPr>
+          <p:nvPr/>
+        </p:nvPicPr>
+        <p:blipFill>
+          <a:blip r:embed="rId2"/>
+          <a:stretch>
+            <a:fillRect/>
+          </a:stretch>
+        </p:blipFill>
+        <p:spPr bwMode="auto">
+          <a:xfrm>
+            <a:off x="1676400" y="1193800"/>
+            <a:ext cx="5803900" cy="2882900"/>
+          </a:xfrm>
+          <a:prstGeom prst="rect">
+            <a:avLst/>
+          </a:prstGeom>
+          <a:noFill/>
+          <a:ln w="9525">
+            <a:noFill/>
+            <a:headEnd/>
+            <a:tailEnd/>
+          </a:ln>
+        </p:spPr>
+      </p:pic>
+      <p:sp>
+        <p:nvSpPr>
+          <p:cNvPr id="1" name="TextBox 3"/>
+          <p:cNvSpPr txBox="1"/>
+          <p:nvPr/>
+        </p:nvSpPr>
+        <p:spPr>
+          <a:xfrm>
+            <a:off x="457200" y="4076700"/>
+            <a:ext cx="8229600" cy="508000"/>
+          </a:xfrm>
+          <a:prstGeom prst="rect">
+            <a:avLst/>
+          </a:prstGeom>
+          <a:noFill/>
+        </p:spPr>
+        <p:txBody>
+          <a:bodyPr/>
+          <a:lstStyle/>
+          <a:p>
+            <a:pPr lvl="0" indent="0" marL="0" algn="ctr">
+              <a:buNone/>
+            </a:pPr>
             <a:r>
               <a:rPr/>
-              <a:t>宏观数据</a:t>
-            </a:r>
-          </a:p>
-          <a:p>
-            <a:pPr lvl="0"/>
-            <a:r>
-              <a:rPr/>
-              <a:t>微观数据</a:t>
-            </a:r>
-          </a:p>
-          <a:p>
-            <a:pPr lvl="0"/>
-            <a:r>
-              <a:rPr/>
-              <a:t>截面数据</a:t>
-            </a:r>
-          </a:p>
-          <a:p>
-            <a:pPr lvl="0"/>
-            <a:r>
-              <a:rPr/>
-              <a:t>时间序列</a:t>
-            </a:r>
-          </a:p>
-          <a:p>
-            <a:pPr lvl="0"/>
-            <a:r>
-              <a:rPr/>
-              <a:t>定性数据</a:t>
-            </a:r>
-          </a:p>
-          <a:p>
-            <a:pPr lvl="0"/>
-            <a:r>
-              <a:rPr/>
-              <a:t>定量数据</a:t>
+              <a:t>图3.2 设置直方图的分组区间</a:t>
             </a:r>
           </a:p>
         </p:txBody>
@@ -3926,30 +4359,67 @@
             </a:pPr>
             <a:r>
               <a:rPr/>
-              <a:t>1.1.2 整理数据</a:t>
-            </a:r>
-          </a:p>
-        </p:txBody>
-      </p:sp>
-      <p:sp>
-        <p:nvSpPr>
-          <p:cNvPr id="3" name="Content Placeholder 2"/>
-          <p:cNvSpPr>
-            <a:spLocks noGrp="1"/>
-          </p:cNvSpPr>
-          <p:nvPr>
-            <p:ph idx="1"/>
-          </p:nvPr>
-        </p:nvSpPr>
-        <p:spPr/>
-        <p:txBody>
-          <a:bodyPr/>
-          <a:lstStyle/>
-          <a:p>
-            <a:pPr lvl="0"/>
+              <a:t>3.1.2 基于频数分布表绘制直方图</a:t>
+            </a:r>
+          </a:p>
+        </p:txBody>
+      </p:sp>
+      <p:pic>
+        <p:nvPicPr>
+          <p:cNvPr descr="img/pic3.5.png" id="0" name="Picture 1"/>
+          <p:cNvPicPr>
+            <a:picLocks noGrp="1" noChangeAspect="1"/>
+          </p:cNvPicPr>
+          <p:nvPr/>
+        </p:nvPicPr>
+        <p:blipFill>
+          <a:blip r:embed="rId2"/>
+          <a:stretch>
+            <a:fillRect/>
+          </a:stretch>
+        </p:blipFill>
+        <p:spPr bwMode="auto">
+          <a:xfrm>
+            <a:off x="1752600" y="1193800"/>
+            <a:ext cx="5638800" cy="2882900"/>
+          </a:xfrm>
+          <a:prstGeom prst="rect">
+            <a:avLst/>
+          </a:prstGeom>
+          <a:noFill/>
+          <a:ln w="9525">
+            <a:noFill/>
+            <a:headEnd/>
+            <a:tailEnd/>
+          </a:ln>
+        </p:spPr>
+      </p:pic>
+      <p:sp>
+        <p:nvSpPr>
+          <p:cNvPr id="1" name="TextBox 3"/>
+          <p:cNvSpPr txBox="1"/>
+          <p:nvPr/>
+        </p:nvSpPr>
+        <p:spPr>
+          <a:xfrm>
+            <a:off x="457200" y="4076700"/>
+            <a:ext cx="8229600" cy="508000"/>
+          </a:xfrm>
+          <a:prstGeom prst="rect">
+            <a:avLst/>
+          </a:prstGeom>
+          <a:noFill/>
+        </p:spPr>
+        <p:txBody>
+          <a:bodyPr/>
+          <a:lstStyle/>
+          <a:p>
+            <a:pPr lvl="0" indent="0" marL="0" algn="ctr">
+              <a:buNone/>
+            </a:pPr>
             <a:r>
               <a:rPr/>
-              <a:t>1.4 Excel中的数据清洗工具</a:t>
+              <a:t>图3.2 设置直方图的分组区间</a:t>
             </a:r>
           </a:p>
         </p:txBody>
@@ -3996,51 +4466,67 @@
             </a:pPr>
             <a:r>
               <a:rPr/>
-              <a:t>1.1.3 分析数据</a:t>
-            </a:r>
-          </a:p>
-        </p:txBody>
-      </p:sp>
-      <p:sp>
-        <p:nvSpPr>
-          <p:cNvPr id="3" name="Content Placeholder 2"/>
-          <p:cNvSpPr>
-            <a:spLocks noGrp="1"/>
-          </p:cNvSpPr>
-          <p:nvPr>
-            <p:ph idx="1"/>
-          </p:nvPr>
-        </p:nvSpPr>
-        <p:spPr/>
-        <p:txBody>
-          <a:bodyPr/>
-          <a:lstStyle/>
-          <a:p>
-            <a:pPr lvl="0"/>
+              <a:t>3.1.2 基于频数分布表绘制直方图</a:t>
+            </a:r>
+          </a:p>
+        </p:txBody>
+      </p:sp>
+      <p:pic>
+        <p:nvPicPr>
+          <p:cNvPr descr="img/pic3.7.png" id="0" name="Picture 1"/>
+          <p:cNvPicPr>
+            <a:picLocks noGrp="1" noChangeAspect="1"/>
+          </p:cNvPicPr>
+          <p:nvPr/>
+        </p:nvPicPr>
+        <p:blipFill>
+          <a:blip r:embed="rId2"/>
+          <a:stretch>
+            <a:fillRect/>
+          </a:stretch>
+        </p:blipFill>
+        <p:spPr bwMode="auto">
+          <a:xfrm>
+            <a:off x="1422400" y="1193800"/>
+            <a:ext cx="6286500" cy="2882900"/>
+          </a:xfrm>
+          <a:prstGeom prst="rect">
+            <a:avLst/>
+          </a:prstGeom>
+          <a:noFill/>
+          <a:ln w="9525">
+            <a:noFill/>
+            <a:headEnd/>
+            <a:tailEnd/>
+          </a:ln>
+        </p:spPr>
+      </p:pic>
+      <p:sp>
+        <p:nvSpPr>
+          <p:cNvPr id="1" name="TextBox 3"/>
+          <p:cNvSpPr txBox="1"/>
+          <p:nvPr/>
+        </p:nvSpPr>
+        <p:spPr>
+          <a:xfrm>
+            <a:off x="457200" y="4076700"/>
+            <a:ext cx="8229600" cy="508000"/>
+          </a:xfrm>
+          <a:prstGeom prst="rect">
+            <a:avLst/>
+          </a:prstGeom>
+          <a:noFill/>
+        </p:spPr>
+        <p:txBody>
+          <a:bodyPr/>
+          <a:lstStyle/>
+          <a:p>
+            <a:pPr lvl="0" indent="0" marL="0" algn="ctr">
+              <a:buNone/>
+            </a:pPr>
             <a:r>
               <a:rPr/>
-              <a:t>第2章-第5章：描述统计方法</a:t>
-            </a:r>
-          </a:p>
-          <a:p>
-            <a:pPr lvl="0"/>
-            <a:r>
-              <a:rPr/>
-              <a:t>第6章至第8章：推断统计准备知识</a:t>
-            </a:r>
-          </a:p>
-          <a:p>
-            <a:pPr lvl="0"/>
-            <a:r>
-              <a:rPr/>
-              <a:t>第9章至第15章：推断统计方法</a:t>
-            </a:r>
-          </a:p>
-          <a:p>
-            <a:pPr lvl="0"/>
-            <a:r>
-              <a:rPr/>
-              <a:t>第16章：时间序列</a:t>
+              <a:t>图3.2 设置直方图的分组区间</a:t>
             </a:r>
           </a:p>
         </p:txBody>
@@ -4087,7 +4573,7 @@
             </a:pPr>
             <a:r>
               <a:rPr/>
-              <a:t>全书框架</a:t>
+              <a:t>3.1 基于原始数据绘制直方图实操技巧</a:t>
             </a:r>
           </a:p>
         </p:txBody>
@@ -4107,9 +4593,25 @@
           <a:bodyPr/>
           <a:lstStyle/>
           <a:p>
-            <a:pPr lvl="0" indent="0" marL="0">
-              <a:buNone/>
-            </a:pPr>
+            <a:pPr lvl="0"/>
+            <a:r>
+              <a:rPr/>
+              <a:t>选中定量数据所在的列，单击“插入”→“统计” →“直方图”，创建直方图。</a:t>
+            </a:r>
+          </a:p>
+          <a:p>
+            <a:pPr lvl="0"/>
+            <a:r>
+              <a:rPr/>
+              <a:t>利用数据透视表创建频数分布表，单击“插入”→“柱形图”，将柱形间隙调整为0，创建直方图。</a:t>
+            </a:r>
+          </a:p>
+          <a:p>
+            <a:pPr lvl="0"/>
+            <a:r>
+              <a:rPr/>
+              <a:t>绘制直方图时，需要对组矩进行多次尝试，选择适宜的组距，展示定量数据的分布特征。</a:t>
+            </a:r>
           </a:p>
         </p:txBody>
       </p:sp>
@@ -4155,7 +4657,45 @@
             </a:pPr>
             <a:r>
               <a:rPr/>
-              <a:t>1.1.4 提炼结论</a:t>
+              <a:t>3.2 分布折线图</a:t>
+            </a:r>
+          </a:p>
+        </p:txBody>
+      </p:sp>
+      <p:sp>
+        <p:nvSpPr>
+          <p:cNvPr id="3" name="Content Placeholder 2"/>
+          <p:cNvSpPr>
+            <a:spLocks noGrp="1"/>
+          </p:cNvSpPr>
+          <p:nvPr>
+            <p:ph idx="1"/>
+          </p:nvPr>
+        </p:nvSpPr>
+        <p:spPr/>
+        <p:txBody>
+          <a:bodyPr/>
+          <a:lstStyle/>
+          <a:p>
+            <a:pPr lvl="0"/>
+            <a:r>
+              <a:rPr/>
+              <a:t>3.2.1 频数折线图</a:t>
+            </a:r>
+          </a:p>
+          <a:p>
+            <a:pPr lvl="0"/>
+            <a:r>
+              <a:rPr/>
+              <a:t>3.2.2 累积频数折线图</a:t>
+            </a:r>
+            <a:br/>
+          </a:p>
+          <a:p>
+            <a:pPr lvl="0"/>
+            <a:r>
+              <a:rPr/>
+              <a:t>3.2.3 累积百分比折线图</a:t>
             </a:r>
           </a:p>
         </p:txBody>
@@ -4202,7 +4742,7 @@
             </a:pPr>
             <a:r>
               <a:rPr/>
-              <a:t>1.2 Excel的统计分析工具</a:t>
+              <a:t>3.2.1 频数折线图</a:t>
             </a:r>
           </a:p>
         </p:txBody>
@@ -4222,24 +4762,12 @@
           <a:bodyPr/>
           <a:lstStyle/>
           <a:p>
-            <a:pPr lvl="0"/>
+            <a:pPr lvl="0" indent="0" marL="0">
+              <a:buNone/>
+            </a:pPr>
             <a:r>
               <a:rPr/>
-              <a:t>1.2.1 图表工具</a:t>
-            </a:r>
-          </a:p>
-          <a:p>
-            <a:pPr lvl="0"/>
-            <a:r>
-              <a:rPr/>
-              <a:t>1.2.2 函数工具</a:t>
-            </a:r>
-          </a:p>
-          <a:p>
-            <a:pPr lvl="0"/>
-            <a:r>
-              <a:rPr/>
-              <a:t>1.2.3 数据分析工具</a:t>
+              <a:t>年龄的频数折线图 图3.8 年龄的频数折线图</a:t>
             </a:r>
           </a:p>
         </p:txBody>

</xml_diff>